<commit_message>
KP-72 add roboto system diagram and map
</commit_message>
<xml_diff>
--- a/Documents/hirojiren_scenario.pptx
+++ b/Documents/hirojiren_scenario.pptx
@@ -6,6 +6,9 @@
   </p:sldMasterIdLst>
   <p:sldIdLst>
     <p:sldId id="256" r:id="rId2"/>
+    <p:sldId id="257" r:id="rId3"/>
+    <p:sldId id="258" r:id="rId4"/>
+    <p:sldId id="259" r:id="rId5"/>
   </p:sldIdLst>
   <p:sldSz cx="12192000" cy="6858000"/>
   <p:notesSz cx="6858000" cy="9144000"/>
@@ -3698,6 +3701,2011 @@
 </p:sld>
 </file>
 
+<file path=ppt/slides/slide2.xml><?xml version="1.0" encoding="utf-8"?>
+<p:sld xmlns:a="http://schemas.openxmlformats.org/drawingml/2006/main" xmlns:r="http://schemas.openxmlformats.org/officeDocument/2006/relationships" xmlns:p="http://schemas.openxmlformats.org/presentationml/2006/main">
+  <p:cSld>
+    <p:spTree>
+      <p:nvGrpSpPr>
+        <p:cNvPr id="1" name=""/>
+        <p:cNvGrpSpPr/>
+        <p:nvPr/>
+      </p:nvGrpSpPr>
+      <p:grpSpPr>
+        <a:xfrm>
+          <a:off x="0" y="0"/>
+          <a:ext cx="0" cy="0"/>
+          <a:chOff x="0" y="0"/>
+          <a:chExt cx="0" cy="0"/>
+        </a:xfrm>
+      </p:grpSpPr>
+      <p:grpSp>
+        <p:nvGrpSpPr>
+          <p:cNvPr id="59" name="グループ化 58">
+            <a:extLst>
+              <a:ext uri="{FF2B5EF4-FFF2-40B4-BE49-F238E27FC236}">
+                <a16:creationId xmlns:a16="http://schemas.microsoft.com/office/drawing/2014/main" id="{CBAD14F2-1CE3-1A4A-AC82-18C05BBA5CBF}"/>
+              </a:ext>
+            </a:extLst>
+          </p:cNvPr>
+          <p:cNvGrpSpPr/>
+          <p:nvPr/>
+        </p:nvGrpSpPr>
+        <p:grpSpPr>
+          <a:xfrm>
+            <a:off x="3588124" y="2221005"/>
+            <a:ext cx="4408394" cy="2431677"/>
+            <a:chOff x="3588124" y="2221005"/>
+            <a:chExt cx="4408394" cy="2431677"/>
+          </a:xfrm>
+        </p:grpSpPr>
+        <p:sp>
+          <p:nvSpPr>
+            <p:cNvPr id="45" name="正方形/長方形 44">
+              <a:extLst>
+                <a:ext uri="{FF2B5EF4-FFF2-40B4-BE49-F238E27FC236}">
+                  <a16:creationId xmlns:a16="http://schemas.microsoft.com/office/drawing/2014/main" id="{F56E5649-D1B1-274E-BD1B-2A237E414AF0}"/>
+                </a:ext>
+              </a:extLst>
+            </p:cNvPr>
+            <p:cNvSpPr/>
+            <p:nvPr/>
+          </p:nvSpPr>
+          <p:spPr>
+            <a:xfrm rot="2708135">
+              <a:off x="4159624" y="1649505"/>
+              <a:ext cx="1497106" cy="2640106"/>
+            </a:xfrm>
+            <a:prstGeom prst="rect">
+              <a:avLst/>
+            </a:prstGeom>
+            <a:solidFill>
+              <a:schemeClr val="bg1">
+                <a:lumMod val="95000"/>
+              </a:schemeClr>
+            </a:solidFill>
+            <a:ln w="12700">
+              <a:solidFill>
+                <a:schemeClr val="tx1"/>
+              </a:solidFill>
+            </a:ln>
+          </p:spPr>
+          <p:style>
+            <a:lnRef idx="2">
+              <a:schemeClr val="accent1">
+                <a:shade val="50000"/>
+              </a:schemeClr>
+            </a:lnRef>
+            <a:fillRef idx="1">
+              <a:schemeClr val="accent1"/>
+            </a:fillRef>
+            <a:effectRef idx="0">
+              <a:schemeClr val="accent1"/>
+            </a:effectRef>
+            <a:fontRef idx="minor">
+              <a:schemeClr val="lt1"/>
+            </a:fontRef>
+          </p:style>
+          <p:txBody>
+            <a:bodyPr rtlCol="0" anchor="ctr"/>
+            <a:lstStyle/>
+            <a:p>
+              <a:pPr algn="ctr"/>
+              <a:endParaRPr kumimoji="1" lang="ja-JP" altLang="en-US"/>
+            </a:p>
+          </p:txBody>
+        </p:sp>
+        <p:sp>
+          <p:nvSpPr>
+            <p:cNvPr id="33" name="正方形/長方形 32">
+              <a:extLst>
+                <a:ext uri="{FF2B5EF4-FFF2-40B4-BE49-F238E27FC236}">
+                  <a16:creationId xmlns:a16="http://schemas.microsoft.com/office/drawing/2014/main" id="{79F2556D-3BF4-0540-AF4B-51FC5A2CB234}"/>
+                </a:ext>
+              </a:extLst>
+            </p:cNvPr>
+            <p:cNvSpPr/>
+            <p:nvPr/>
+          </p:nvSpPr>
+          <p:spPr>
+            <a:xfrm>
+              <a:off x="4714481" y="4231912"/>
+              <a:ext cx="3282037" cy="420770"/>
+            </a:xfrm>
+            <a:prstGeom prst="rect">
+              <a:avLst/>
+            </a:prstGeom>
+            <a:solidFill>
+              <a:schemeClr val="bg1">
+                <a:lumMod val="95000"/>
+              </a:schemeClr>
+            </a:solidFill>
+            <a:ln w="12700">
+              <a:solidFill>
+                <a:schemeClr val="tx1"/>
+              </a:solidFill>
+            </a:ln>
+          </p:spPr>
+          <p:style>
+            <a:lnRef idx="2">
+              <a:schemeClr val="accent1">
+                <a:shade val="50000"/>
+              </a:schemeClr>
+            </a:lnRef>
+            <a:fillRef idx="1">
+              <a:schemeClr val="accent1"/>
+            </a:fillRef>
+            <a:effectRef idx="0">
+              <a:schemeClr val="accent1"/>
+            </a:effectRef>
+            <a:fontRef idx="minor">
+              <a:schemeClr val="lt1"/>
+            </a:fontRef>
+          </p:style>
+          <p:txBody>
+            <a:bodyPr rtlCol="0" anchor="ctr"/>
+            <a:lstStyle/>
+            <a:p>
+              <a:pPr algn="ctr"/>
+              <a:endParaRPr kumimoji="1" lang="ja-JP" altLang="en-US"/>
+            </a:p>
+          </p:txBody>
+        </p:sp>
+      </p:grpSp>
+      <p:sp>
+        <p:nvSpPr>
+          <p:cNvPr id="20" name="片側の 2 つの角を切り取った四角形 19">
+            <a:extLst>
+              <a:ext uri="{FF2B5EF4-FFF2-40B4-BE49-F238E27FC236}">
+                <a16:creationId xmlns:a16="http://schemas.microsoft.com/office/drawing/2014/main" id="{994F6E10-0C0B-E74E-B5BF-07DA3D7A11CF}"/>
+              </a:ext>
+            </a:extLst>
+          </p:cNvPr>
+          <p:cNvSpPr/>
+          <p:nvPr/>
+        </p:nvSpPr>
+        <p:spPr>
+          <a:xfrm flipV="1">
+            <a:off x="2763306" y="4795735"/>
+            <a:ext cx="592737" cy="648205"/>
+          </a:xfrm>
+          <a:prstGeom prst="snip2SameRect">
+            <a:avLst/>
+          </a:prstGeom>
+          <a:solidFill>
+            <a:schemeClr val="accent1">
+              <a:lumMod val="20000"/>
+              <a:lumOff val="80000"/>
+            </a:schemeClr>
+          </a:solidFill>
+          <a:ln w="12700">
+            <a:solidFill>
+              <a:schemeClr val="tx1"/>
+            </a:solidFill>
+          </a:ln>
+        </p:spPr>
+        <p:style>
+          <a:lnRef idx="2">
+            <a:schemeClr val="accent1">
+              <a:shade val="50000"/>
+            </a:schemeClr>
+          </a:lnRef>
+          <a:fillRef idx="1">
+            <a:schemeClr val="accent1"/>
+          </a:fillRef>
+          <a:effectRef idx="0">
+            <a:schemeClr val="accent1"/>
+          </a:effectRef>
+          <a:fontRef idx="minor">
+            <a:schemeClr val="lt1"/>
+          </a:fontRef>
+        </p:style>
+        <p:txBody>
+          <a:bodyPr rtlCol="0" anchor="ctr"/>
+          <a:lstStyle/>
+          <a:p>
+            <a:pPr algn="ctr"/>
+            <a:endParaRPr kumimoji="1" lang="ja-JP" altLang="en-US"/>
+          </a:p>
+        </p:txBody>
+      </p:sp>
+      <p:cxnSp>
+        <p:nvCxnSpPr>
+          <p:cNvPr id="12" name="直線コネクタ 11">
+            <a:extLst>
+              <a:ext uri="{FF2B5EF4-FFF2-40B4-BE49-F238E27FC236}">
+                <a16:creationId xmlns:a16="http://schemas.microsoft.com/office/drawing/2014/main" id="{5A4A64E8-5D1E-7244-9DD0-09862EF77525}"/>
+              </a:ext>
+            </a:extLst>
+          </p:cNvPr>
+          <p:cNvCxnSpPr/>
+          <p:nvPr/>
+        </p:nvCxnSpPr>
+        <p:spPr>
+          <a:xfrm>
+            <a:off x="1682885" y="5992237"/>
+            <a:ext cx="9309370" cy="0"/>
+          </a:xfrm>
+          <a:prstGeom prst="line">
+            <a:avLst/>
+          </a:prstGeom>
+        </p:spPr>
+        <p:style>
+          <a:lnRef idx="1">
+            <a:schemeClr val="accent1"/>
+          </a:lnRef>
+          <a:fillRef idx="0">
+            <a:schemeClr val="accent1"/>
+          </a:fillRef>
+          <a:effectRef idx="0">
+            <a:schemeClr val="accent1"/>
+          </a:effectRef>
+          <a:fontRef idx="minor">
+            <a:schemeClr val="tx1"/>
+          </a:fontRef>
+        </p:style>
+      </p:cxnSp>
+      <p:grpSp>
+        <p:nvGrpSpPr>
+          <p:cNvPr id="29" name="グループ化 28">
+            <a:extLst>
+              <a:ext uri="{FF2B5EF4-FFF2-40B4-BE49-F238E27FC236}">
+                <a16:creationId xmlns:a16="http://schemas.microsoft.com/office/drawing/2014/main" id="{11B7519D-3544-574E-AB7E-85005C12F179}"/>
+              </a:ext>
+            </a:extLst>
+          </p:cNvPr>
+          <p:cNvGrpSpPr/>
+          <p:nvPr/>
+        </p:nvGrpSpPr>
+        <p:grpSpPr>
+          <a:xfrm>
+            <a:off x="2613303" y="5453668"/>
+            <a:ext cx="898381" cy="606663"/>
+            <a:chOff x="4096544" y="1776264"/>
+            <a:chExt cx="576064" cy="504056"/>
+          </a:xfrm>
+        </p:grpSpPr>
+        <p:sp>
+          <p:nvSpPr>
+            <p:cNvPr id="30" name="三角形 29">
+              <a:extLst>
+                <a:ext uri="{FF2B5EF4-FFF2-40B4-BE49-F238E27FC236}">
+                  <a16:creationId xmlns:a16="http://schemas.microsoft.com/office/drawing/2014/main" id="{1EC59E7F-8481-B448-B4D0-2EFB82D94EE8}"/>
+                </a:ext>
+              </a:extLst>
+            </p:cNvPr>
+            <p:cNvSpPr/>
+            <p:nvPr/>
+          </p:nvSpPr>
+          <p:spPr>
+            <a:xfrm>
+              <a:off x="4096544" y="1776264"/>
+              <a:ext cx="576064" cy="360040"/>
+            </a:xfrm>
+            <a:prstGeom prst="triangle">
+              <a:avLst/>
+            </a:prstGeom>
+            <a:solidFill>
+              <a:schemeClr val="bg1"/>
+            </a:solidFill>
+          </p:spPr>
+          <p:style>
+            <a:lnRef idx="2">
+              <a:schemeClr val="accent1">
+                <a:shade val="50000"/>
+              </a:schemeClr>
+            </a:lnRef>
+            <a:fillRef idx="1">
+              <a:schemeClr val="accent1"/>
+            </a:fillRef>
+            <a:effectRef idx="0">
+              <a:schemeClr val="accent1"/>
+            </a:effectRef>
+            <a:fontRef idx="minor">
+              <a:schemeClr val="lt1"/>
+            </a:fontRef>
+          </p:style>
+          <p:txBody>
+            <a:bodyPr rtlCol="0" anchor="ctr"/>
+            <a:lstStyle/>
+            <a:p>
+              <a:pPr algn="ctr"/>
+              <a:endParaRPr kumimoji="1" lang="ja-JP" altLang="en-US"/>
+            </a:p>
+          </p:txBody>
+        </p:sp>
+        <p:sp>
+          <p:nvSpPr>
+            <p:cNvPr id="31" name="円/楕円 30">
+              <a:extLst>
+                <a:ext uri="{FF2B5EF4-FFF2-40B4-BE49-F238E27FC236}">
+                  <a16:creationId xmlns:a16="http://schemas.microsoft.com/office/drawing/2014/main" id="{FA9B417D-32DE-D549-9368-AD00CDC881B6}"/>
+                </a:ext>
+              </a:extLst>
+            </p:cNvPr>
+            <p:cNvSpPr/>
+            <p:nvPr/>
+          </p:nvSpPr>
+          <p:spPr>
+            <a:xfrm>
+              <a:off x="4096544" y="2064296"/>
+              <a:ext cx="576064" cy="216024"/>
+            </a:xfrm>
+            <a:prstGeom prst="ellipse">
+              <a:avLst/>
+            </a:prstGeom>
+          </p:spPr>
+          <p:style>
+            <a:lnRef idx="2">
+              <a:schemeClr val="accent1">
+                <a:shade val="50000"/>
+              </a:schemeClr>
+            </a:lnRef>
+            <a:fillRef idx="1">
+              <a:schemeClr val="accent1"/>
+            </a:fillRef>
+            <a:effectRef idx="0">
+              <a:schemeClr val="accent1"/>
+            </a:effectRef>
+            <a:fontRef idx="minor">
+              <a:schemeClr val="lt1"/>
+            </a:fontRef>
+          </p:style>
+          <p:txBody>
+            <a:bodyPr rtlCol="0" anchor="ctr"/>
+            <a:lstStyle/>
+            <a:p>
+              <a:pPr algn="ctr"/>
+              <a:endParaRPr kumimoji="1" lang="ja-JP" altLang="en-US"/>
+            </a:p>
+          </p:txBody>
+        </p:sp>
+      </p:grpSp>
+      <p:grpSp>
+        <p:nvGrpSpPr>
+          <p:cNvPr id="18" name="グループ化 17">
+            <a:extLst>
+              <a:ext uri="{FF2B5EF4-FFF2-40B4-BE49-F238E27FC236}">
+                <a16:creationId xmlns:a16="http://schemas.microsoft.com/office/drawing/2014/main" id="{A19B65C5-22B9-CD48-9803-FDC51EA6206F}"/>
+              </a:ext>
+            </a:extLst>
+          </p:cNvPr>
+          <p:cNvGrpSpPr/>
+          <p:nvPr/>
+        </p:nvGrpSpPr>
+        <p:grpSpPr>
+          <a:xfrm>
+            <a:off x="3297677" y="3570051"/>
+            <a:ext cx="2412459" cy="2412459"/>
+            <a:chOff x="3297677" y="3570051"/>
+            <a:chExt cx="2412459" cy="2412459"/>
+          </a:xfrm>
+        </p:grpSpPr>
+        <p:sp>
+          <p:nvSpPr>
+            <p:cNvPr id="14" name="円/楕円 13">
+              <a:extLst>
+                <a:ext uri="{FF2B5EF4-FFF2-40B4-BE49-F238E27FC236}">
+                  <a16:creationId xmlns:a16="http://schemas.microsoft.com/office/drawing/2014/main" id="{95BC6E65-A6A6-DA4F-89B6-318AFFF06831}"/>
+                </a:ext>
+              </a:extLst>
+            </p:cNvPr>
+            <p:cNvSpPr/>
+            <p:nvPr/>
+          </p:nvSpPr>
+          <p:spPr>
+            <a:xfrm>
+              <a:off x="4166681" y="4439055"/>
+              <a:ext cx="674450" cy="674450"/>
+            </a:xfrm>
+            <a:prstGeom prst="ellipse">
+              <a:avLst/>
+            </a:prstGeom>
+            <a:solidFill>
+              <a:schemeClr val="bg1">
+                <a:lumMod val="85000"/>
+              </a:schemeClr>
+            </a:solidFill>
+            <a:ln w="12700">
+              <a:solidFill>
+                <a:schemeClr val="tx1"/>
+              </a:solidFill>
+            </a:ln>
+          </p:spPr>
+          <p:style>
+            <a:lnRef idx="2">
+              <a:schemeClr val="accent1">
+                <a:shade val="50000"/>
+              </a:schemeClr>
+            </a:lnRef>
+            <a:fillRef idx="1">
+              <a:schemeClr val="accent1"/>
+            </a:fillRef>
+            <a:effectRef idx="0">
+              <a:schemeClr val="accent1"/>
+            </a:effectRef>
+            <a:fontRef idx="minor">
+              <a:schemeClr val="lt1"/>
+            </a:fontRef>
+          </p:style>
+          <p:txBody>
+            <a:bodyPr rtlCol="0" anchor="ctr"/>
+            <a:lstStyle/>
+            <a:p>
+              <a:pPr algn="ctr"/>
+              <a:endParaRPr kumimoji="1" lang="ja-JP" altLang="en-US"/>
+            </a:p>
+          </p:txBody>
+        </p:sp>
+        <p:grpSp>
+          <p:nvGrpSpPr>
+            <p:cNvPr id="10" name="グループ化 9">
+              <a:extLst>
+                <a:ext uri="{FF2B5EF4-FFF2-40B4-BE49-F238E27FC236}">
+                  <a16:creationId xmlns:a16="http://schemas.microsoft.com/office/drawing/2014/main" id="{101C7940-1F2F-9B46-86F9-5B87F71BEC85}"/>
+                </a:ext>
+              </a:extLst>
+            </p:cNvPr>
+            <p:cNvGrpSpPr/>
+            <p:nvPr/>
+          </p:nvGrpSpPr>
+          <p:grpSpPr>
+            <a:xfrm>
+              <a:off x="3297677" y="3570051"/>
+              <a:ext cx="2412459" cy="2412459"/>
+              <a:chOff x="3297677" y="3570051"/>
+              <a:chExt cx="2412459" cy="2412459"/>
+            </a:xfrm>
+          </p:grpSpPr>
+          <p:sp>
+            <p:nvSpPr>
+              <p:cNvPr id="5" name="円/楕円 4">
+                <a:extLst>
+                  <a:ext uri="{FF2B5EF4-FFF2-40B4-BE49-F238E27FC236}">
+                    <a16:creationId xmlns:a16="http://schemas.microsoft.com/office/drawing/2014/main" id="{FC6F3BDA-439B-414C-B97A-9DD594111347}"/>
+                  </a:ext>
+                </a:extLst>
+              </p:cNvPr>
+              <p:cNvSpPr/>
+              <p:nvPr/>
+            </p:nvSpPr>
+            <p:spPr>
+              <a:xfrm>
+                <a:off x="3297677" y="3570051"/>
+                <a:ext cx="2412459" cy="2412459"/>
+              </a:xfrm>
+              <a:prstGeom prst="ellipse">
+                <a:avLst/>
+              </a:prstGeom>
+              <a:noFill/>
+              <a:ln w="12700">
+                <a:solidFill>
+                  <a:schemeClr val="tx1"/>
+                </a:solidFill>
+              </a:ln>
+            </p:spPr>
+            <p:style>
+              <a:lnRef idx="2">
+                <a:schemeClr val="accent1">
+                  <a:shade val="50000"/>
+                </a:schemeClr>
+              </a:lnRef>
+              <a:fillRef idx="1">
+                <a:schemeClr val="accent1"/>
+              </a:fillRef>
+              <a:effectRef idx="0">
+                <a:schemeClr val="accent1"/>
+              </a:effectRef>
+              <a:fontRef idx="minor">
+                <a:schemeClr val="lt1"/>
+              </a:fontRef>
+            </p:style>
+            <p:txBody>
+              <a:bodyPr rtlCol="0" anchor="ctr"/>
+              <a:lstStyle/>
+              <a:p>
+                <a:pPr algn="ctr"/>
+                <a:endParaRPr kumimoji="1" lang="ja-JP" altLang="en-US"/>
+              </a:p>
+            </p:txBody>
+          </p:sp>
+          <p:cxnSp>
+            <p:nvCxnSpPr>
+              <p:cNvPr id="7" name="直線コネクタ 6">
+                <a:extLst>
+                  <a:ext uri="{FF2B5EF4-FFF2-40B4-BE49-F238E27FC236}">
+                    <a16:creationId xmlns:a16="http://schemas.microsoft.com/office/drawing/2014/main" id="{A02EA583-404A-9E4B-A6B5-7EE81711ADFD}"/>
+                  </a:ext>
+                </a:extLst>
+              </p:cNvPr>
+              <p:cNvCxnSpPr>
+                <a:stCxn id="5" idx="2"/>
+                <a:endCxn id="5" idx="6"/>
+              </p:cNvCxnSpPr>
+              <p:nvPr/>
+            </p:nvCxnSpPr>
+            <p:spPr>
+              <a:xfrm>
+                <a:off x="3297677" y="4776281"/>
+                <a:ext cx="2412459" cy="0"/>
+              </a:xfrm>
+              <a:prstGeom prst="line">
+                <a:avLst/>
+              </a:prstGeom>
+              <a:ln w="12700">
+                <a:solidFill>
+                  <a:schemeClr val="tx1"/>
+                </a:solidFill>
+              </a:ln>
+            </p:spPr>
+            <p:style>
+              <a:lnRef idx="1">
+                <a:schemeClr val="accent1"/>
+              </a:lnRef>
+              <a:fillRef idx="0">
+                <a:schemeClr val="accent1"/>
+              </a:fillRef>
+              <a:effectRef idx="0">
+                <a:schemeClr val="accent1"/>
+              </a:effectRef>
+              <a:fontRef idx="minor">
+                <a:schemeClr val="tx1"/>
+              </a:fontRef>
+            </p:style>
+          </p:cxnSp>
+          <p:cxnSp>
+            <p:nvCxnSpPr>
+              <p:cNvPr id="9" name="直線コネクタ 8">
+                <a:extLst>
+                  <a:ext uri="{FF2B5EF4-FFF2-40B4-BE49-F238E27FC236}">
+                    <a16:creationId xmlns:a16="http://schemas.microsoft.com/office/drawing/2014/main" id="{71EA019B-6F62-1647-B74E-7733CB3104E5}"/>
+                  </a:ext>
+                </a:extLst>
+              </p:cNvPr>
+              <p:cNvCxnSpPr>
+                <a:stCxn id="5" idx="4"/>
+                <a:endCxn id="5" idx="0"/>
+              </p:cNvCxnSpPr>
+              <p:nvPr/>
+            </p:nvCxnSpPr>
+            <p:spPr>
+              <a:xfrm flipV="1">
+                <a:off x="4503907" y="3570051"/>
+                <a:ext cx="0" cy="2412459"/>
+              </a:xfrm>
+              <a:prstGeom prst="line">
+                <a:avLst/>
+              </a:prstGeom>
+              <a:ln w="12700">
+                <a:solidFill>
+                  <a:schemeClr val="tx1"/>
+                </a:solidFill>
+              </a:ln>
+            </p:spPr>
+            <p:style>
+              <a:lnRef idx="1">
+                <a:schemeClr val="accent1"/>
+              </a:lnRef>
+              <a:fillRef idx="0">
+                <a:schemeClr val="accent1"/>
+              </a:fillRef>
+              <a:effectRef idx="0">
+                <a:schemeClr val="accent1"/>
+              </a:effectRef>
+              <a:fontRef idx="minor">
+                <a:schemeClr val="tx1"/>
+              </a:fontRef>
+            </p:style>
+          </p:cxnSp>
+        </p:grpSp>
+      </p:grpSp>
+      <p:grpSp>
+        <p:nvGrpSpPr>
+          <p:cNvPr id="38" name="グループ化 37">
+            <a:extLst>
+              <a:ext uri="{FF2B5EF4-FFF2-40B4-BE49-F238E27FC236}">
+                <a16:creationId xmlns:a16="http://schemas.microsoft.com/office/drawing/2014/main" id="{AB0C279A-ECDD-B44B-9384-4375A465EB70}"/>
+              </a:ext>
+            </a:extLst>
+          </p:cNvPr>
+          <p:cNvGrpSpPr/>
+          <p:nvPr/>
+        </p:nvGrpSpPr>
+        <p:grpSpPr>
+          <a:xfrm>
+            <a:off x="3385226" y="3429000"/>
+            <a:ext cx="674450" cy="674450"/>
+            <a:chOff x="3385226" y="3429000"/>
+            <a:chExt cx="674450" cy="674450"/>
+          </a:xfrm>
+          <a:solidFill>
+            <a:schemeClr val="accent1">
+              <a:lumMod val="20000"/>
+              <a:lumOff val="80000"/>
+            </a:schemeClr>
+          </a:solidFill>
+        </p:grpSpPr>
+        <p:sp>
+          <p:nvSpPr>
+            <p:cNvPr id="17" name="円/楕円 16">
+              <a:extLst>
+                <a:ext uri="{FF2B5EF4-FFF2-40B4-BE49-F238E27FC236}">
+                  <a16:creationId xmlns:a16="http://schemas.microsoft.com/office/drawing/2014/main" id="{C16068F6-A4D1-EC4B-90FC-8043BEBD199F}"/>
+                </a:ext>
+              </a:extLst>
+            </p:cNvPr>
+            <p:cNvSpPr/>
+            <p:nvPr/>
+          </p:nvSpPr>
+          <p:spPr>
+            <a:xfrm>
+              <a:off x="3385226" y="3429000"/>
+              <a:ext cx="674450" cy="674450"/>
+            </a:xfrm>
+            <a:prstGeom prst="ellipse">
+              <a:avLst/>
+            </a:prstGeom>
+            <a:grpFill/>
+            <a:ln w="12700">
+              <a:solidFill>
+                <a:schemeClr val="tx1"/>
+              </a:solidFill>
+            </a:ln>
+          </p:spPr>
+          <p:style>
+            <a:lnRef idx="2">
+              <a:schemeClr val="accent1">
+                <a:shade val="50000"/>
+              </a:schemeClr>
+            </a:lnRef>
+            <a:fillRef idx="1">
+              <a:schemeClr val="accent1"/>
+            </a:fillRef>
+            <a:effectRef idx="0">
+              <a:schemeClr val="accent1"/>
+            </a:effectRef>
+            <a:fontRef idx="minor">
+              <a:schemeClr val="lt1"/>
+            </a:fontRef>
+          </p:style>
+          <p:txBody>
+            <a:bodyPr rtlCol="0" anchor="ctr"/>
+            <a:lstStyle/>
+            <a:p>
+              <a:pPr algn="ctr"/>
+              <a:endParaRPr kumimoji="1" lang="ja-JP" altLang="en-US"/>
+            </a:p>
+          </p:txBody>
+        </p:sp>
+        <p:cxnSp>
+          <p:nvCxnSpPr>
+            <p:cNvPr id="35" name="直線コネクタ 34">
+              <a:extLst>
+                <a:ext uri="{FF2B5EF4-FFF2-40B4-BE49-F238E27FC236}">
+                  <a16:creationId xmlns:a16="http://schemas.microsoft.com/office/drawing/2014/main" id="{47055E78-8374-0342-8953-D075EBACBCB5}"/>
+                </a:ext>
+              </a:extLst>
+            </p:cNvPr>
+            <p:cNvCxnSpPr>
+              <a:stCxn id="17" idx="6"/>
+              <a:endCxn id="17" idx="2"/>
+            </p:cNvCxnSpPr>
+            <p:nvPr/>
+          </p:nvCxnSpPr>
+          <p:spPr>
+            <a:xfrm flipH="1">
+              <a:off x="3385226" y="3766225"/>
+              <a:ext cx="674450" cy="0"/>
+            </a:xfrm>
+            <a:prstGeom prst="line">
+              <a:avLst/>
+            </a:prstGeom>
+            <a:grpFill/>
+            <a:ln w="12700">
+              <a:solidFill>
+                <a:schemeClr val="tx1"/>
+              </a:solidFill>
+            </a:ln>
+          </p:spPr>
+          <p:style>
+            <a:lnRef idx="1">
+              <a:schemeClr val="accent1"/>
+            </a:lnRef>
+            <a:fillRef idx="0">
+              <a:schemeClr val="accent1"/>
+            </a:fillRef>
+            <a:effectRef idx="0">
+              <a:schemeClr val="accent1"/>
+            </a:effectRef>
+            <a:fontRef idx="minor">
+              <a:schemeClr val="tx1"/>
+            </a:fontRef>
+          </p:style>
+        </p:cxnSp>
+        <p:cxnSp>
+          <p:nvCxnSpPr>
+            <p:cNvPr id="37" name="直線コネクタ 36">
+              <a:extLst>
+                <a:ext uri="{FF2B5EF4-FFF2-40B4-BE49-F238E27FC236}">
+                  <a16:creationId xmlns:a16="http://schemas.microsoft.com/office/drawing/2014/main" id="{E20BA8D3-03D0-C64F-97AC-A90F2A6FFD64}"/>
+                </a:ext>
+              </a:extLst>
+            </p:cNvPr>
+            <p:cNvCxnSpPr>
+              <a:endCxn id="17" idx="0"/>
+            </p:cNvCxnSpPr>
+            <p:nvPr/>
+          </p:nvCxnSpPr>
+          <p:spPr>
+            <a:xfrm flipV="1">
+              <a:off x="3715966" y="3429000"/>
+              <a:ext cx="6485" cy="666345"/>
+            </a:xfrm>
+            <a:prstGeom prst="line">
+              <a:avLst/>
+            </a:prstGeom>
+            <a:grpFill/>
+            <a:ln w="12700">
+              <a:solidFill>
+                <a:schemeClr val="tx1"/>
+              </a:solidFill>
+            </a:ln>
+          </p:spPr>
+          <p:style>
+            <a:lnRef idx="1">
+              <a:schemeClr val="accent1"/>
+            </a:lnRef>
+            <a:fillRef idx="0">
+              <a:schemeClr val="accent1"/>
+            </a:fillRef>
+            <a:effectRef idx="0">
+              <a:schemeClr val="accent1"/>
+            </a:effectRef>
+            <a:fontRef idx="minor">
+              <a:schemeClr val="tx1"/>
+            </a:fontRef>
+          </p:style>
+        </p:cxnSp>
+      </p:grpSp>
+      <p:sp>
+        <p:nvSpPr>
+          <p:cNvPr id="32" name="L 字 31">
+            <a:extLst>
+              <a:ext uri="{FF2B5EF4-FFF2-40B4-BE49-F238E27FC236}">
+                <a16:creationId xmlns:a16="http://schemas.microsoft.com/office/drawing/2014/main" id="{32488DE0-CAB9-6746-9A76-087E0ACBFD80}"/>
+              </a:ext>
+            </a:extLst>
+          </p:cNvPr>
+          <p:cNvSpPr/>
+          <p:nvPr/>
+        </p:nvSpPr>
+        <p:spPr>
+          <a:xfrm flipH="1">
+            <a:off x="1649506" y="3880386"/>
+            <a:ext cx="2141993" cy="1381328"/>
+          </a:xfrm>
+          <a:prstGeom prst="corner">
+            <a:avLst>
+              <a:gd name="adj1" fmla="val 9883"/>
+              <a:gd name="adj2" fmla="val 10345"/>
+            </a:avLst>
+          </a:prstGeom>
+          <a:solidFill>
+            <a:schemeClr val="accent1">
+              <a:lumMod val="20000"/>
+              <a:lumOff val="80000"/>
+            </a:schemeClr>
+          </a:solidFill>
+          <a:ln>
+            <a:solidFill>
+              <a:schemeClr val="tx1"/>
+            </a:solidFill>
+          </a:ln>
+        </p:spPr>
+        <p:style>
+          <a:lnRef idx="2">
+            <a:schemeClr val="accent1">
+              <a:shade val="50000"/>
+            </a:schemeClr>
+          </a:lnRef>
+          <a:fillRef idx="1">
+            <a:schemeClr val="accent1"/>
+          </a:fillRef>
+          <a:effectRef idx="0">
+            <a:schemeClr val="accent1"/>
+          </a:effectRef>
+          <a:fontRef idx="minor">
+            <a:schemeClr val="lt1"/>
+          </a:fontRef>
+        </p:style>
+        <p:txBody>
+          <a:bodyPr rtlCol="0" anchor="ctr"/>
+          <a:lstStyle/>
+          <a:p>
+            <a:pPr algn="ctr"/>
+            <a:endParaRPr kumimoji="1" lang="ja-JP" altLang="en-US"/>
+          </a:p>
+        </p:txBody>
+      </p:sp>
+      <p:grpSp>
+        <p:nvGrpSpPr>
+          <p:cNvPr id="47" name="グループ化 46">
+            <a:extLst>
+              <a:ext uri="{FF2B5EF4-FFF2-40B4-BE49-F238E27FC236}">
+                <a16:creationId xmlns:a16="http://schemas.microsoft.com/office/drawing/2014/main" id="{6793783F-6E7C-EF46-B08B-AF8A709B5CE6}"/>
+              </a:ext>
+            </a:extLst>
+          </p:cNvPr>
+          <p:cNvGrpSpPr/>
+          <p:nvPr/>
+        </p:nvGrpSpPr>
+        <p:grpSpPr>
+          <a:xfrm>
+            <a:off x="1568822" y="2102223"/>
+            <a:ext cx="2142566" cy="1326777"/>
+            <a:chOff x="1568822" y="2102223"/>
+            <a:chExt cx="2142566" cy="1326777"/>
+          </a:xfrm>
+        </p:grpSpPr>
+        <p:grpSp>
+          <p:nvGrpSpPr>
+            <p:cNvPr id="44" name="グループ化 43">
+              <a:extLst>
+                <a:ext uri="{FF2B5EF4-FFF2-40B4-BE49-F238E27FC236}">
+                  <a16:creationId xmlns:a16="http://schemas.microsoft.com/office/drawing/2014/main" id="{A855BF42-8B9B-C24F-BDB7-698AC33C537D}"/>
+                </a:ext>
+              </a:extLst>
+            </p:cNvPr>
+            <p:cNvGrpSpPr/>
+            <p:nvPr/>
+          </p:nvGrpSpPr>
+          <p:grpSpPr>
+            <a:xfrm>
+              <a:off x="1568822" y="2102223"/>
+              <a:ext cx="1303967" cy="1326777"/>
+              <a:chOff x="4150657" y="2102223"/>
+              <a:chExt cx="1303967" cy="1326777"/>
+            </a:xfrm>
+          </p:grpSpPr>
+          <p:sp>
+            <p:nvSpPr>
+              <p:cNvPr id="39" name="片側の 2 つの角を切り取った四角形 38">
+                <a:extLst>
+                  <a:ext uri="{FF2B5EF4-FFF2-40B4-BE49-F238E27FC236}">
+                    <a16:creationId xmlns:a16="http://schemas.microsoft.com/office/drawing/2014/main" id="{2DCE4FBB-E173-FC4E-A6E6-B9ACDE105EC8}"/>
+                  </a:ext>
+                </a:extLst>
+              </p:cNvPr>
+              <p:cNvSpPr/>
+              <p:nvPr/>
+            </p:nvSpPr>
+            <p:spPr>
+              <a:xfrm rot="16200000" flipV="1">
+                <a:off x="4834153" y="2500770"/>
+                <a:ext cx="592737" cy="648205"/>
+              </a:xfrm>
+              <a:prstGeom prst="snip2SameRect">
+                <a:avLst/>
+              </a:prstGeom>
+              <a:solidFill>
+                <a:schemeClr val="accent2">
+                  <a:lumMod val="20000"/>
+                  <a:lumOff val="80000"/>
+                </a:schemeClr>
+              </a:solidFill>
+              <a:ln w="12700">
+                <a:solidFill>
+                  <a:schemeClr val="tx1"/>
+                </a:solidFill>
+              </a:ln>
+            </p:spPr>
+            <p:style>
+              <a:lnRef idx="2">
+                <a:schemeClr val="accent1">
+                  <a:shade val="50000"/>
+                </a:schemeClr>
+              </a:lnRef>
+              <a:fillRef idx="1">
+                <a:schemeClr val="accent1"/>
+              </a:fillRef>
+              <a:effectRef idx="0">
+                <a:schemeClr val="accent1"/>
+              </a:effectRef>
+              <a:fontRef idx="minor">
+                <a:schemeClr val="lt1"/>
+              </a:fontRef>
+            </p:style>
+            <p:txBody>
+              <a:bodyPr rtlCol="0" anchor="ctr"/>
+              <a:lstStyle/>
+              <a:p>
+                <a:pPr algn="ctr"/>
+                <a:endParaRPr kumimoji="1" lang="ja-JP" altLang="en-US"/>
+              </a:p>
+            </p:txBody>
+          </p:sp>
+          <p:grpSp>
+            <p:nvGrpSpPr>
+              <p:cNvPr id="43" name="グループ化 42">
+                <a:extLst>
+                  <a:ext uri="{FF2B5EF4-FFF2-40B4-BE49-F238E27FC236}">
+                    <a16:creationId xmlns:a16="http://schemas.microsoft.com/office/drawing/2014/main" id="{F79545D0-B85D-4A45-B41F-BE495556F9AB}"/>
+                  </a:ext>
+                </a:extLst>
+              </p:cNvPr>
+              <p:cNvGrpSpPr/>
+              <p:nvPr/>
+            </p:nvGrpSpPr>
+            <p:grpSpPr>
+              <a:xfrm>
+                <a:off x="4150657" y="2102223"/>
+                <a:ext cx="1120589" cy="1326777"/>
+                <a:chOff x="3774140" y="1452282"/>
+                <a:chExt cx="1120589" cy="1326777"/>
+              </a:xfrm>
+            </p:grpSpPr>
+            <p:sp>
+              <p:nvSpPr>
+                <p:cNvPr id="40" name="円弧 39">
+                  <a:extLst>
+                    <a:ext uri="{FF2B5EF4-FFF2-40B4-BE49-F238E27FC236}">
+                      <a16:creationId xmlns:a16="http://schemas.microsoft.com/office/drawing/2014/main" id="{86D38046-C761-3646-B461-1E3CFB7C8B8A}"/>
+                    </a:ext>
+                  </a:extLst>
+                </p:cNvPr>
+                <p:cNvSpPr/>
+                <p:nvPr/>
+              </p:nvSpPr>
+              <p:spPr>
+                <a:xfrm>
+                  <a:off x="3774140" y="1452282"/>
+                  <a:ext cx="815789" cy="1326777"/>
+                </a:xfrm>
+                <a:prstGeom prst="arc">
+                  <a:avLst>
+                    <a:gd name="adj1" fmla="val 6718735"/>
+                    <a:gd name="adj2" fmla="val 14974613"/>
+                  </a:avLst>
+                </a:prstGeom>
+              </p:spPr>
+              <p:style>
+                <a:lnRef idx="1">
+                  <a:schemeClr val="accent1"/>
+                </a:lnRef>
+                <a:fillRef idx="0">
+                  <a:schemeClr val="accent1"/>
+                </a:fillRef>
+                <a:effectRef idx="0">
+                  <a:schemeClr val="accent1"/>
+                </a:effectRef>
+                <a:fontRef idx="minor">
+                  <a:schemeClr val="tx1"/>
+                </a:fontRef>
+              </p:style>
+              <p:txBody>
+                <a:bodyPr rtlCol="0" anchor="ctr"/>
+                <a:lstStyle/>
+                <a:p>
+                  <a:pPr algn="ctr"/>
+                  <a:endParaRPr kumimoji="1" lang="ja-JP" altLang="en-US"/>
+                </a:p>
+              </p:txBody>
+            </p:sp>
+            <p:sp>
+              <p:nvSpPr>
+                <p:cNvPr id="41" name="円弧 40">
+                  <a:extLst>
+                    <a:ext uri="{FF2B5EF4-FFF2-40B4-BE49-F238E27FC236}">
+                      <a16:creationId xmlns:a16="http://schemas.microsoft.com/office/drawing/2014/main" id="{A164673C-EF62-E240-87CC-4F300A58BF9F}"/>
+                    </a:ext>
+                  </a:extLst>
+                </p:cNvPr>
+                <p:cNvSpPr/>
+                <p:nvPr/>
+              </p:nvSpPr>
+              <p:spPr>
+                <a:xfrm>
+                  <a:off x="3926540" y="1600200"/>
+                  <a:ext cx="815789" cy="1030941"/>
+                </a:xfrm>
+                <a:prstGeom prst="arc">
+                  <a:avLst>
+                    <a:gd name="adj1" fmla="val 6718735"/>
+                    <a:gd name="adj2" fmla="val 14974613"/>
+                  </a:avLst>
+                </a:prstGeom>
+              </p:spPr>
+              <p:style>
+                <a:lnRef idx="1">
+                  <a:schemeClr val="accent1"/>
+                </a:lnRef>
+                <a:fillRef idx="0">
+                  <a:schemeClr val="accent1"/>
+                </a:fillRef>
+                <a:effectRef idx="0">
+                  <a:schemeClr val="accent1"/>
+                </a:effectRef>
+                <a:fontRef idx="minor">
+                  <a:schemeClr val="tx1"/>
+                </a:fontRef>
+              </p:style>
+              <p:txBody>
+                <a:bodyPr rtlCol="0" anchor="ctr"/>
+                <a:lstStyle/>
+                <a:p>
+                  <a:pPr algn="ctr"/>
+                  <a:endParaRPr kumimoji="1" lang="ja-JP" altLang="en-US"/>
+                </a:p>
+              </p:txBody>
+            </p:sp>
+            <p:sp>
+              <p:nvSpPr>
+                <p:cNvPr id="42" name="円弧 41">
+                  <a:extLst>
+                    <a:ext uri="{FF2B5EF4-FFF2-40B4-BE49-F238E27FC236}">
+                      <a16:creationId xmlns:a16="http://schemas.microsoft.com/office/drawing/2014/main" id="{ED505722-AB6D-3E47-BA49-B4536F823129}"/>
+                    </a:ext>
+                  </a:extLst>
+                </p:cNvPr>
+                <p:cNvSpPr/>
+                <p:nvPr/>
+              </p:nvSpPr>
+              <p:spPr>
+                <a:xfrm>
+                  <a:off x="4078940" y="1698811"/>
+                  <a:ext cx="815789" cy="833718"/>
+                </a:xfrm>
+                <a:prstGeom prst="arc">
+                  <a:avLst>
+                    <a:gd name="adj1" fmla="val 6718735"/>
+                    <a:gd name="adj2" fmla="val 14974613"/>
+                  </a:avLst>
+                </a:prstGeom>
+              </p:spPr>
+              <p:style>
+                <a:lnRef idx="1">
+                  <a:schemeClr val="accent1"/>
+                </a:lnRef>
+                <a:fillRef idx="0">
+                  <a:schemeClr val="accent1"/>
+                </a:fillRef>
+                <a:effectRef idx="0">
+                  <a:schemeClr val="accent1"/>
+                </a:effectRef>
+                <a:fontRef idx="minor">
+                  <a:schemeClr val="tx1"/>
+                </a:fontRef>
+              </p:style>
+              <p:txBody>
+                <a:bodyPr rtlCol="0" anchor="ctr"/>
+                <a:lstStyle/>
+                <a:p>
+                  <a:pPr algn="ctr"/>
+                  <a:endParaRPr kumimoji="1" lang="ja-JP" altLang="en-US"/>
+                </a:p>
+              </p:txBody>
+            </p:sp>
+          </p:grpSp>
+        </p:grpSp>
+        <p:sp>
+          <p:nvSpPr>
+            <p:cNvPr id="46" name="正方形/長方形 45">
+              <a:extLst>
+                <a:ext uri="{FF2B5EF4-FFF2-40B4-BE49-F238E27FC236}">
+                  <a16:creationId xmlns:a16="http://schemas.microsoft.com/office/drawing/2014/main" id="{C487CA86-E873-A643-BF93-B2317374DD71}"/>
+                </a:ext>
+              </a:extLst>
+            </p:cNvPr>
+            <p:cNvSpPr/>
+            <p:nvPr/>
+          </p:nvSpPr>
+          <p:spPr>
+            <a:xfrm>
+              <a:off x="2401587" y="3128682"/>
+              <a:ext cx="1309801" cy="127032"/>
+            </a:xfrm>
+            <a:prstGeom prst="rect">
+              <a:avLst/>
+            </a:prstGeom>
+            <a:solidFill>
+              <a:schemeClr val="accent2">
+                <a:lumMod val="20000"/>
+                <a:lumOff val="80000"/>
+              </a:schemeClr>
+            </a:solidFill>
+          </p:spPr>
+          <p:style>
+            <a:lnRef idx="2">
+              <a:schemeClr val="accent1">
+                <a:shade val="50000"/>
+              </a:schemeClr>
+            </a:lnRef>
+            <a:fillRef idx="1">
+              <a:schemeClr val="accent1"/>
+            </a:fillRef>
+            <a:effectRef idx="0">
+              <a:schemeClr val="accent1"/>
+            </a:effectRef>
+            <a:fontRef idx="minor">
+              <a:schemeClr val="lt1"/>
+            </a:fontRef>
+          </p:style>
+          <p:txBody>
+            <a:bodyPr rtlCol="0" anchor="ctr"/>
+            <a:lstStyle/>
+            <a:p>
+              <a:pPr algn="ctr"/>
+              <a:endParaRPr kumimoji="1" lang="ja-JP" altLang="en-US"/>
+            </a:p>
+          </p:txBody>
+        </p:sp>
+      </p:grpSp>
+      <p:grpSp>
+        <p:nvGrpSpPr>
+          <p:cNvPr id="67" name="グループ化 66">
+            <a:extLst>
+              <a:ext uri="{FF2B5EF4-FFF2-40B4-BE49-F238E27FC236}">
+                <a16:creationId xmlns:a16="http://schemas.microsoft.com/office/drawing/2014/main" id="{A5FECC56-0FB4-164D-BD43-B8C72FB2B817}"/>
+              </a:ext>
+            </a:extLst>
+          </p:cNvPr>
+          <p:cNvGrpSpPr/>
+          <p:nvPr/>
+        </p:nvGrpSpPr>
+        <p:grpSpPr>
+          <a:xfrm>
+            <a:off x="5746377" y="4316506"/>
+            <a:ext cx="2580509" cy="1651603"/>
+            <a:chOff x="5746377" y="4316506"/>
+            <a:chExt cx="2580509" cy="1651603"/>
+          </a:xfrm>
+        </p:grpSpPr>
+        <p:grpSp>
+          <p:nvGrpSpPr>
+            <p:cNvPr id="49" name="グループ化 48">
+              <a:extLst>
+                <a:ext uri="{FF2B5EF4-FFF2-40B4-BE49-F238E27FC236}">
+                  <a16:creationId xmlns:a16="http://schemas.microsoft.com/office/drawing/2014/main" id="{E2DE31E5-06AD-6F49-A568-0B7E55B925D3}"/>
+                </a:ext>
+              </a:extLst>
+            </p:cNvPr>
+            <p:cNvGrpSpPr/>
+            <p:nvPr/>
+          </p:nvGrpSpPr>
+          <p:grpSpPr>
+            <a:xfrm>
+              <a:off x="7652436" y="4316506"/>
+              <a:ext cx="674450" cy="674450"/>
+              <a:chOff x="3385226" y="3429000"/>
+              <a:chExt cx="674450" cy="674450"/>
+            </a:xfrm>
+            <a:solidFill>
+              <a:schemeClr val="accent6">
+                <a:lumMod val="20000"/>
+                <a:lumOff val="80000"/>
+              </a:schemeClr>
+            </a:solidFill>
+          </p:grpSpPr>
+          <p:sp>
+            <p:nvSpPr>
+              <p:cNvPr id="50" name="円/楕円 49">
+                <a:extLst>
+                  <a:ext uri="{FF2B5EF4-FFF2-40B4-BE49-F238E27FC236}">
+                    <a16:creationId xmlns:a16="http://schemas.microsoft.com/office/drawing/2014/main" id="{CB07BC6C-F1FD-484C-8FA0-49EB093AED70}"/>
+                  </a:ext>
+                </a:extLst>
+              </p:cNvPr>
+              <p:cNvSpPr/>
+              <p:nvPr/>
+            </p:nvSpPr>
+            <p:spPr>
+              <a:xfrm>
+                <a:off x="3385226" y="3429000"/>
+                <a:ext cx="674450" cy="674450"/>
+              </a:xfrm>
+              <a:prstGeom prst="ellipse">
+                <a:avLst/>
+              </a:prstGeom>
+              <a:grpFill/>
+              <a:ln w="12700">
+                <a:solidFill>
+                  <a:schemeClr val="tx1"/>
+                </a:solidFill>
+              </a:ln>
+            </p:spPr>
+            <p:style>
+              <a:lnRef idx="2">
+                <a:schemeClr val="accent1">
+                  <a:shade val="50000"/>
+                </a:schemeClr>
+              </a:lnRef>
+              <a:fillRef idx="1">
+                <a:schemeClr val="accent1"/>
+              </a:fillRef>
+              <a:effectRef idx="0">
+                <a:schemeClr val="accent1"/>
+              </a:effectRef>
+              <a:fontRef idx="minor">
+                <a:schemeClr val="lt1"/>
+              </a:fontRef>
+            </p:style>
+            <p:txBody>
+              <a:bodyPr rtlCol="0" anchor="ctr"/>
+              <a:lstStyle/>
+              <a:p>
+                <a:pPr algn="ctr"/>
+                <a:endParaRPr kumimoji="1" lang="ja-JP" altLang="en-US"/>
+              </a:p>
+            </p:txBody>
+          </p:sp>
+          <p:cxnSp>
+            <p:nvCxnSpPr>
+              <p:cNvPr id="51" name="直線コネクタ 50">
+                <a:extLst>
+                  <a:ext uri="{FF2B5EF4-FFF2-40B4-BE49-F238E27FC236}">
+                    <a16:creationId xmlns:a16="http://schemas.microsoft.com/office/drawing/2014/main" id="{ABC6D782-BE7F-C245-8D32-AB9CBD827AAB}"/>
+                  </a:ext>
+                </a:extLst>
+              </p:cNvPr>
+              <p:cNvCxnSpPr>
+                <a:stCxn id="50" idx="6"/>
+                <a:endCxn id="50" idx="2"/>
+              </p:cNvCxnSpPr>
+              <p:nvPr/>
+            </p:nvCxnSpPr>
+            <p:spPr>
+              <a:xfrm flipH="1">
+                <a:off x="3385226" y="3766225"/>
+                <a:ext cx="674450" cy="0"/>
+              </a:xfrm>
+              <a:prstGeom prst="line">
+                <a:avLst/>
+              </a:prstGeom>
+              <a:grpFill/>
+              <a:ln w="12700">
+                <a:solidFill>
+                  <a:schemeClr val="tx1"/>
+                </a:solidFill>
+              </a:ln>
+            </p:spPr>
+            <p:style>
+              <a:lnRef idx="1">
+                <a:schemeClr val="accent1"/>
+              </a:lnRef>
+              <a:fillRef idx="0">
+                <a:schemeClr val="accent1"/>
+              </a:fillRef>
+              <a:effectRef idx="0">
+                <a:schemeClr val="accent1"/>
+              </a:effectRef>
+              <a:fontRef idx="minor">
+                <a:schemeClr val="tx1"/>
+              </a:fontRef>
+            </p:style>
+          </p:cxnSp>
+          <p:cxnSp>
+            <p:nvCxnSpPr>
+              <p:cNvPr id="52" name="直線コネクタ 51">
+                <a:extLst>
+                  <a:ext uri="{FF2B5EF4-FFF2-40B4-BE49-F238E27FC236}">
+                    <a16:creationId xmlns:a16="http://schemas.microsoft.com/office/drawing/2014/main" id="{74D4EFDB-2EDC-E945-9102-FF205236DD78}"/>
+                  </a:ext>
+                </a:extLst>
+              </p:cNvPr>
+              <p:cNvCxnSpPr>
+                <a:endCxn id="50" idx="0"/>
+              </p:cNvCxnSpPr>
+              <p:nvPr/>
+            </p:nvCxnSpPr>
+            <p:spPr>
+              <a:xfrm flipV="1">
+                <a:off x="3715966" y="3429000"/>
+                <a:ext cx="6485" cy="666345"/>
+              </a:xfrm>
+              <a:prstGeom prst="line">
+                <a:avLst/>
+              </a:prstGeom>
+              <a:grpFill/>
+              <a:ln w="12700">
+                <a:solidFill>
+                  <a:schemeClr val="tx1"/>
+                </a:solidFill>
+              </a:ln>
+            </p:spPr>
+            <p:style>
+              <a:lnRef idx="1">
+                <a:schemeClr val="accent1"/>
+              </a:lnRef>
+              <a:fillRef idx="0">
+                <a:schemeClr val="accent1"/>
+              </a:fillRef>
+              <a:effectRef idx="0">
+                <a:schemeClr val="accent1"/>
+              </a:effectRef>
+              <a:fontRef idx="minor">
+                <a:schemeClr val="tx1"/>
+              </a:fontRef>
+            </p:style>
+          </p:cxnSp>
+        </p:grpSp>
+        <p:sp>
+          <p:nvSpPr>
+            <p:cNvPr id="60" name="正方形/長方形 59">
+              <a:extLst>
+                <a:ext uri="{FF2B5EF4-FFF2-40B4-BE49-F238E27FC236}">
+                  <a16:creationId xmlns:a16="http://schemas.microsoft.com/office/drawing/2014/main" id="{484EB7E4-4029-7A4D-879E-B7D88DD2DA1B}"/>
+                </a:ext>
+              </a:extLst>
+            </p:cNvPr>
+            <p:cNvSpPr/>
+            <p:nvPr/>
+          </p:nvSpPr>
+          <p:spPr>
+            <a:xfrm>
+              <a:off x="5746377" y="4831976"/>
+              <a:ext cx="2232212" cy="161365"/>
+            </a:xfrm>
+            <a:prstGeom prst="rect">
+              <a:avLst/>
+            </a:prstGeom>
+            <a:solidFill>
+              <a:schemeClr val="accent6">
+                <a:lumMod val="20000"/>
+                <a:lumOff val="80000"/>
+              </a:schemeClr>
+            </a:solidFill>
+            <a:ln w="12700">
+              <a:solidFill>
+                <a:schemeClr val="tx1"/>
+              </a:solidFill>
+            </a:ln>
+          </p:spPr>
+          <p:style>
+            <a:lnRef idx="2">
+              <a:schemeClr val="accent1">
+                <a:shade val="50000"/>
+              </a:schemeClr>
+            </a:lnRef>
+            <a:fillRef idx="1">
+              <a:schemeClr val="accent1"/>
+            </a:fillRef>
+            <a:effectRef idx="0">
+              <a:schemeClr val="accent1"/>
+            </a:effectRef>
+            <a:fontRef idx="minor">
+              <a:schemeClr val="lt1"/>
+            </a:fontRef>
+          </p:style>
+          <p:txBody>
+            <a:bodyPr rtlCol="0" anchor="ctr"/>
+            <a:lstStyle/>
+            <a:p>
+              <a:pPr algn="ctr"/>
+              <a:endParaRPr kumimoji="1" lang="ja-JP" altLang="en-US"/>
+            </a:p>
+          </p:txBody>
+        </p:sp>
+        <p:grpSp>
+          <p:nvGrpSpPr>
+            <p:cNvPr id="66" name="グループ化 65">
+              <a:extLst>
+                <a:ext uri="{FF2B5EF4-FFF2-40B4-BE49-F238E27FC236}">
+                  <a16:creationId xmlns:a16="http://schemas.microsoft.com/office/drawing/2014/main" id="{584A2695-63B3-F84D-8157-BADBC276CC8A}"/>
+                </a:ext>
+              </a:extLst>
+            </p:cNvPr>
+            <p:cNvGrpSpPr/>
+            <p:nvPr/>
+          </p:nvGrpSpPr>
+          <p:grpSpPr>
+            <a:xfrm>
+              <a:off x="6585635" y="4993341"/>
+              <a:ext cx="674450" cy="974768"/>
+              <a:chOff x="6585635" y="4993341"/>
+              <a:chExt cx="674450" cy="974768"/>
+            </a:xfrm>
+          </p:grpSpPr>
+          <p:grpSp>
+            <p:nvGrpSpPr>
+              <p:cNvPr id="61" name="グループ化 60">
+                <a:extLst>
+                  <a:ext uri="{FF2B5EF4-FFF2-40B4-BE49-F238E27FC236}">
+                    <a16:creationId xmlns:a16="http://schemas.microsoft.com/office/drawing/2014/main" id="{13ABB243-0EE3-6449-B162-4D1737DBF78B}"/>
+                  </a:ext>
+                </a:extLst>
+              </p:cNvPr>
+              <p:cNvGrpSpPr/>
+              <p:nvPr/>
+            </p:nvGrpSpPr>
+            <p:grpSpPr>
+              <a:xfrm>
+                <a:off x="6585635" y="5293659"/>
+                <a:ext cx="674450" cy="674450"/>
+                <a:chOff x="3385226" y="3429000"/>
+                <a:chExt cx="674450" cy="674450"/>
+              </a:xfrm>
+              <a:solidFill>
+                <a:schemeClr val="accent6">
+                  <a:lumMod val="20000"/>
+                  <a:lumOff val="80000"/>
+                </a:schemeClr>
+              </a:solidFill>
+            </p:grpSpPr>
+            <p:sp>
+              <p:nvSpPr>
+                <p:cNvPr id="62" name="円/楕円 61">
+                  <a:extLst>
+                    <a:ext uri="{FF2B5EF4-FFF2-40B4-BE49-F238E27FC236}">
+                      <a16:creationId xmlns:a16="http://schemas.microsoft.com/office/drawing/2014/main" id="{CBAA3278-E88D-9648-9780-A971C0C07152}"/>
+                    </a:ext>
+                  </a:extLst>
+                </p:cNvPr>
+                <p:cNvSpPr/>
+                <p:nvPr/>
+              </p:nvSpPr>
+              <p:spPr>
+                <a:xfrm>
+                  <a:off x="3385226" y="3429000"/>
+                  <a:ext cx="674450" cy="674450"/>
+                </a:xfrm>
+                <a:prstGeom prst="ellipse">
+                  <a:avLst/>
+                </a:prstGeom>
+                <a:grpFill/>
+                <a:ln w="12700">
+                  <a:solidFill>
+                    <a:schemeClr val="tx1"/>
+                  </a:solidFill>
+                </a:ln>
+              </p:spPr>
+              <p:style>
+                <a:lnRef idx="2">
+                  <a:schemeClr val="accent1">
+                    <a:shade val="50000"/>
+                  </a:schemeClr>
+                </a:lnRef>
+                <a:fillRef idx="1">
+                  <a:schemeClr val="accent1"/>
+                </a:fillRef>
+                <a:effectRef idx="0">
+                  <a:schemeClr val="accent1"/>
+                </a:effectRef>
+                <a:fontRef idx="minor">
+                  <a:schemeClr val="lt1"/>
+                </a:fontRef>
+              </p:style>
+              <p:txBody>
+                <a:bodyPr rtlCol="0" anchor="ctr"/>
+                <a:lstStyle/>
+                <a:p>
+                  <a:pPr algn="ctr"/>
+                  <a:endParaRPr kumimoji="1" lang="ja-JP" altLang="en-US"/>
+                </a:p>
+              </p:txBody>
+            </p:sp>
+            <p:cxnSp>
+              <p:nvCxnSpPr>
+                <p:cNvPr id="63" name="直線コネクタ 62">
+                  <a:extLst>
+                    <a:ext uri="{FF2B5EF4-FFF2-40B4-BE49-F238E27FC236}">
+                      <a16:creationId xmlns:a16="http://schemas.microsoft.com/office/drawing/2014/main" id="{9E5F0E71-BEEE-D94D-9AC7-420D6A526C09}"/>
+                    </a:ext>
+                  </a:extLst>
+                </p:cNvPr>
+                <p:cNvCxnSpPr>
+                  <a:stCxn id="62" idx="6"/>
+                  <a:endCxn id="62" idx="2"/>
+                </p:cNvCxnSpPr>
+                <p:nvPr/>
+              </p:nvCxnSpPr>
+              <p:spPr>
+                <a:xfrm flipH="1">
+                  <a:off x="3385226" y="3766225"/>
+                  <a:ext cx="674450" cy="0"/>
+                </a:xfrm>
+                <a:prstGeom prst="line">
+                  <a:avLst/>
+                </a:prstGeom>
+                <a:grpFill/>
+                <a:ln w="12700">
+                  <a:solidFill>
+                    <a:schemeClr val="tx1"/>
+                  </a:solidFill>
+                </a:ln>
+              </p:spPr>
+              <p:style>
+                <a:lnRef idx="1">
+                  <a:schemeClr val="accent1"/>
+                </a:lnRef>
+                <a:fillRef idx="0">
+                  <a:schemeClr val="accent1"/>
+                </a:fillRef>
+                <a:effectRef idx="0">
+                  <a:schemeClr val="accent1"/>
+                </a:effectRef>
+                <a:fontRef idx="minor">
+                  <a:schemeClr val="tx1"/>
+                </a:fontRef>
+              </p:style>
+            </p:cxnSp>
+            <p:cxnSp>
+              <p:nvCxnSpPr>
+                <p:cNvPr id="64" name="直線コネクタ 63">
+                  <a:extLst>
+                    <a:ext uri="{FF2B5EF4-FFF2-40B4-BE49-F238E27FC236}">
+                      <a16:creationId xmlns:a16="http://schemas.microsoft.com/office/drawing/2014/main" id="{87363DFF-DE64-6549-B31E-770E70ED8452}"/>
+                    </a:ext>
+                  </a:extLst>
+                </p:cNvPr>
+                <p:cNvCxnSpPr>
+                  <a:endCxn id="62" idx="0"/>
+                </p:cNvCxnSpPr>
+                <p:nvPr/>
+              </p:nvCxnSpPr>
+              <p:spPr>
+                <a:xfrm flipV="1">
+                  <a:off x="3715966" y="3429000"/>
+                  <a:ext cx="6485" cy="666345"/>
+                </a:xfrm>
+                <a:prstGeom prst="line">
+                  <a:avLst/>
+                </a:prstGeom>
+                <a:grpFill/>
+                <a:ln w="12700">
+                  <a:solidFill>
+                    <a:schemeClr val="tx1"/>
+                  </a:solidFill>
+                </a:ln>
+              </p:spPr>
+              <p:style>
+                <a:lnRef idx="1">
+                  <a:schemeClr val="accent1"/>
+                </a:lnRef>
+                <a:fillRef idx="0">
+                  <a:schemeClr val="accent1"/>
+                </a:fillRef>
+                <a:effectRef idx="0">
+                  <a:schemeClr val="accent1"/>
+                </a:effectRef>
+                <a:fontRef idx="minor">
+                  <a:schemeClr val="tx1"/>
+                </a:fontRef>
+              </p:style>
+            </p:cxnSp>
+          </p:grpSp>
+          <p:sp>
+            <p:nvSpPr>
+              <p:cNvPr id="65" name="正方形/長方形 64">
+                <a:extLst>
+                  <a:ext uri="{FF2B5EF4-FFF2-40B4-BE49-F238E27FC236}">
+                    <a16:creationId xmlns:a16="http://schemas.microsoft.com/office/drawing/2014/main" id="{6B1B71B7-BEB8-C44B-9119-0D075BA00B82}"/>
+                  </a:ext>
+                </a:extLst>
+              </p:cNvPr>
+              <p:cNvSpPr/>
+              <p:nvPr/>
+            </p:nvSpPr>
+            <p:spPr>
+              <a:xfrm rot="16200000">
+                <a:off x="6609095" y="5233147"/>
+                <a:ext cx="627530" cy="147918"/>
+              </a:xfrm>
+              <a:prstGeom prst="rect">
+                <a:avLst/>
+              </a:prstGeom>
+              <a:solidFill>
+                <a:schemeClr val="accent6">
+                  <a:lumMod val="20000"/>
+                  <a:lumOff val="80000"/>
+                </a:schemeClr>
+              </a:solidFill>
+              <a:ln w="12700">
+                <a:solidFill>
+                  <a:schemeClr val="tx1"/>
+                </a:solidFill>
+              </a:ln>
+            </p:spPr>
+            <p:style>
+              <a:lnRef idx="2">
+                <a:schemeClr val="accent1">
+                  <a:shade val="50000"/>
+                </a:schemeClr>
+              </a:lnRef>
+              <a:fillRef idx="1">
+                <a:schemeClr val="accent1"/>
+              </a:fillRef>
+              <a:effectRef idx="0">
+                <a:schemeClr val="accent1"/>
+              </a:effectRef>
+              <a:fontRef idx="minor">
+                <a:schemeClr val="lt1"/>
+              </a:fontRef>
+            </p:style>
+            <p:txBody>
+              <a:bodyPr rtlCol="0" anchor="ctr"/>
+              <a:lstStyle/>
+              <a:p>
+                <a:pPr algn="ctr"/>
+                <a:endParaRPr kumimoji="1" lang="ja-JP" altLang="en-US"/>
+              </a:p>
+            </p:txBody>
+          </p:sp>
+        </p:grpSp>
+      </p:grpSp>
+      <p:sp>
+        <p:nvSpPr>
+          <p:cNvPr id="68" name="正方形/長方形 67">
+            <a:extLst>
+              <a:ext uri="{FF2B5EF4-FFF2-40B4-BE49-F238E27FC236}">
+                <a16:creationId xmlns:a16="http://schemas.microsoft.com/office/drawing/2014/main" id="{352CE438-4AF5-C841-B571-13EE86D45C3F}"/>
+              </a:ext>
+            </a:extLst>
+          </p:cNvPr>
+          <p:cNvSpPr/>
+          <p:nvPr/>
+        </p:nvSpPr>
+        <p:spPr>
+          <a:xfrm>
+            <a:off x="0" y="0"/>
+            <a:ext cx="12192000" cy="448235"/>
+          </a:xfrm>
+          <a:prstGeom prst="rect">
+            <a:avLst/>
+          </a:prstGeom>
+          <a:solidFill>
+            <a:schemeClr val="accent1">
+              <a:lumMod val="20000"/>
+              <a:lumOff val="80000"/>
+            </a:schemeClr>
+          </a:solidFill>
+          <a:ln>
+            <a:noFill/>
+          </a:ln>
+        </p:spPr>
+        <p:style>
+          <a:lnRef idx="2">
+            <a:schemeClr val="accent1">
+              <a:shade val="50000"/>
+            </a:schemeClr>
+          </a:lnRef>
+          <a:fillRef idx="1">
+            <a:schemeClr val="accent1"/>
+          </a:fillRef>
+          <a:effectRef idx="0">
+            <a:schemeClr val="accent1"/>
+          </a:effectRef>
+          <a:fontRef idx="minor">
+            <a:schemeClr val="lt1"/>
+          </a:fontRef>
+        </p:style>
+        <p:txBody>
+          <a:bodyPr rtlCol="0" anchor="ctr"/>
+          <a:lstStyle/>
+          <a:p>
+            <a:r>
+              <a:rPr kumimoji="1" lang="ja-JP" altLang="en-US">
+                <a:solidFill>
+                  <a:schemeClr val="tx1"/>
+                </a:solidFill>
+              </a:rPr>
+              <a:t>走行体の図</a:t>
+            </a:r>
+          </a:p>
+        </p:txBody>
+      </p:sp>
+      <p:sp>
+        <p:nvSpPr>
+          <p:cNvPr id="69" name="円弧 68">
+            <a:extLst>
+              <a:ext uri="{FF2B5EF4-FFF2-40B4-BE49-F238E27FC236}">
+                <a16:creationId xmlns:a16="http://schemas.microsoft.com/office/drawing/2014/main" id="{E7920B79-D2BB-4E47-9CEB-55FAB9F03C9D}"/>
+              </a:ext>
+            </a:extLst>
+          </p:cNvPr>
+          <p:cNvSpPr/>
+          <p:nvPr/>
+        </p:nvSpPr>
+        <p:spPr>
+          <a:xfrm>
+            <a:off x="2779061" y="2859737"/>
+            <a:ext cx="1837765" cy="1837765"/>
+          </a:xfrm>
+          <a:prstGeom prst="arc">
+            <a:avLst>
+              <a:gd name="adj1" fmla="val 4337217"/>
+              <a:gd name="adj2" fmla="val 11164122"/>
+            </a:avLst>
+          </a:prstGeom>
+          <a:ln>
+            <a:headEnd type="triangle" w="med" len="med"/>
+            <a:tailEnd type="triangle" w="med" len="med"/>
+          </a:ln>
+        </p:spPr>
+        <p:style>
+          <a:lnRef idx="1">
+            <a:schemeClr val="accent1"/>
+          </a:lnRef>
+          <a:fillRef idx="0">
+            <a:schemeClr val="accent1"/>
+          </a:fillRef>
+          <a:effectRef idx="0">
+            <a:schemeClr val="accent1"/>
+          </a:effectRef>
+          <a:fontRef idx="minor">
+            <a:schemeClr val="tx1"/>
+          </a:fontRef>
+        </p:style>
+        <p:txBody>
+          <a:bodyPr rtlCol="0" anchor="ctr"/>
+          <a:lstStyle/>
+          <a:p>
+            <a:pPr algn="ctr"/>
+            <a:endParaRPr kumimoji="1" lang="ja-JP" altLang="en-US"/>
+          </a:p>
+        </p:txBody>
+      </p:sp>
+      <p:sp>
+        <p:nvSpPr>
+          <p:cNvPr id="70" name="円弧 69">
+            <a:extLst>
+              <a:ext uri="{FF2B5EF4-FFF2-40B4-BE49-F238E27FC236}">
+                <a16:creationId xmlns:a16="http://schemas.microsoft.com/office/drawing/2014/main" id="{F1D334A4-1903-124F-A646-A27A694F6F3E}"/>
+              </a:ext>
+            </a:extLst>
+          </p:cNvPr>
+          <p:cNvSpPr/>
+          <p:nvPr/>
+        </p:nvSpPr>
+        <p:spPr>
+          <a:xfrm>
+            <a:off x="7082118" y="3810002"/>
+            <a:ext cx="1837765" cy="1837765"/>
+          </a:xfrm>
+          <a:prstGeom prst="arc">
+            <a:avLst>
+              <a:gd name="adj1" fmla="val 21286009"/>
+              <a:gd name="adj2" fmla="val 11164122"/>
+            </a:avLst>
+          </a:prstGeom>
+          <a:ln>
+            <a:headEnd type="triangle" w="med" len="med"/>
+            <a:tailEnd type="triangle" w="med" len="med"/>
+          </a:ln>
+        </p:spPr>
+        <p:style>
+          <a:lnRef idx="1">
+            <a:schemeClr val="accent1"/>
+          </a:lnRef>
+          <a:fillRef idx="0">
+            <a:schemeClr val="accent1"/>
+          </a:fillRef>
+          <a:effectRef idx="0">
+            <a:schemeClr val="accent1"/>
+          </a:effectRef>
+          <a:fontRef idx="minor">
+            <a:schemeClr val="tx1"/>
+          </a:fontRef>
+        </p:style>
+        <p:txBody>
+          <a:bodyPr rtlCol="0" anchor="ctr"/>
+          <a:lstStyle/>
+          <a:p>
+            <a:pPr algn="ctr"/>
+            <a:endParaRPr kumimoji="1" lang="ja-JP" altLang="en-US"/>
+          </a:p>
+        </p:txBody>
+      </p:sp>
+      <p:sp>
+        <p:nvSpPr>
+          <p:cNvPr id="71" name="円弧 70">
+            <a:extLst>
+              <a:ext uri="{FF2B5EF4-FFF2-40B4-BE49-F238E27FC236}">
+                <a16:creationId xmlns:a16="http://schemas.microsoft.com/office/drawing/2014/main" id="{688202EF-CA42-B947-82D0-DD58D83DCCE1}"/>
+              </a:ext>
+            </a:extLst>
+          </p:cNvPr>
+          <p:cNvSpPr/>
+          <p:nvPr/>
+        </p:nvSpPr>
+        <p:spPr>
+          <a:xfrm>
+            <a:off x="3980330" y="4249274"/>
+            <a:ext cx="1075762" cy="1075762"/>
+          </a:xfrm>
+          <a:prstGeom prst="arc">
+            <a:avLst>
+              <a:gd name="adj1" fmla="val 3731962"/>
+              <a:gd name="adj2" fmla="val 2834782"/>
+            </a:avLst>
+          </a:prstGeom>
+          <a:ln>
+            <a:headEnd type="triangle" w="med" len="med"/>
+            <a:tailEnd type="triangle" w="med" len="med"/>
+          </a:ln>
+        </p:spPr>
+        <p:style>
+          <a:lnRef idx="1">
+            <a:schemeClr val="accent1"/>
+          </a:lnRef>
+          <a:fillRef idx="0">
+            <a:schemeClr val="accent1"/>
+          </a:fillRef>
+          <a:effectRef idx="0">
+            <a:schemeClr val="accent1"/>
+          </a:effectRef>
+          <a:fontRef idx="minor">
+            <a:schemeClr val="tx1"/>
+          </a:fontRef>
+        </p:style>
+        <p:txBody>
+          <a:bodyPr rtlCol="0" anchor="ctr"/>
+          <a:lstStyle/>
+          <a:p>
+            <a:pPr algn="ctr"/>
+            <a:endParaRPr kumimoji="1" lang="ja-JP" altLang="en-US"/>
+          </a:p>
+        </p:txBody>
+      </p:sp>
+    </p:spTree>
+    <p:extLst>
+      <p:ext uri="{BB962C8B-B14F-4D97-AF65-F5344CB8AC3E}">
+        <p14:creationId xmlns:p14="http://schemas.microsoft.com/office/powerpoint/2010/main" val="165515719"/>
+      </p:ext>
+    </p:extLst>
+  </p:cSld>
+  <p:clrMapOvr>
+    <a:masterClrMapping/>
+  </p:clrMapOvr>
+</p:sld>
+</file>
+
+<file path=ppt/slides/slide3.xml><?xml version="1.0" encoding="utf-8"?>
+<p:sld xmlns:a="http://schemas.openxmlformats.org/drawingml/2006/main" xmlns:r="http://schemas.openxmlformats.org/officeDocument/2006/relationships" xmlns:p="http://schemas.openxmlformats.org/presentationml/2006/main">
+  <p:cSld>
+    <p:spTree>
+      <p:nvGrpSpPr>
+        <p:cNvPr id="1" name=""/>
+        <p:cNvGrpSpPr/>
+        <p:nvPr/>
+      </p:nvGrpSpPr>
+      <p:grpSpPr>
+        <a:xfrm>
+          <a:off x="0" y="0"/>
+          <a:ext cx="0" cy="0"/>
+          <a:chOff x="0" y="0"/>
+          <a:chExt cx="0" cy="0"/>
+        </a:xfrm>
+      </p:grpSpPr>
+      <p:pic>
+        <p:nvPicPr>
+          <p:cNvPr id="4" name="図 3">
+            <a:extLst>
+              <a:ext uri="{FF2B5EF4-FFF2-40B4-BE49-F238E27FC236}">
+                <a16:creationId xmlns:a16="http://schemas.microsoft.com/office/drawing/2014/main" id="{B3EE376B-8237-1647-8235-3A65A14B9EEA}"/>
+              </a:ext>
+            </a:extLst>
+          </p:cNvPr>
+          <p:cNvPicPr>
+            <a:picLocks noChangeAspect="1"/>
+          </p:cNvPicPr>
+          <p:nvPr/>
+        </p:nvPicPr>
+        <p:blipFill rotWithShape="1">
+          <a:blip r:embed="rId2"/>
+          <a:srcRect l="50000"/>
+          <a:stretch/>
+        </p:blipFill>
+        <p:spPr>
+          <a:xfrm rot="16200000">
+            <a:off x="1079812" y="860611"/>
+            <a:ext cx="4836893" cy="6858000"/>
+          </a:xfrm>
+          <a:prstGeom prst="rect">
+            <a:avLst/>
+          </a:prstGeom>
+        </p:spPr>
+      </p:pic>
+      <p:pic>
+        <p:nvPicPr>
+          <p:cNvPr id="5" name="図 4">
+            <a:extLst>
+              <a:ext uri="{FF2B5EF4-FFF2-40B4-BE49-F238E27FC236}">
+                <a16:creationId xmlns:a16="http://schemas.microsoft.com/office/drawing/2014/main" id="{A26965DC-C0DC-6143-A6B9-5AEF0A25AA1E}"/>
+              </a:ext>
+            </a:extLst>
+          </p:cNvPr>
+          <p:cNvPicPr>
+            <a:picLocks noChangeAspect="1"/>
+          </p:cNvPicPr>
+          <p:nvPr/>
+        </p:nvPicPr>
+        <p:blipFill rotWithShape="1">
+          <a:blip r:embed="rId2"/>
+          <a:srcRect r="50000"/>
+          <a:stretch/>
+        </p:blipFill>
+        <p:spPr>
+          <a:xfrm rot="10800000">
+            <a:off x="7109012" y="-62753"/>
+            <a:ext cx="4836892" cy="6858000"/>
+          </a:xfrm>
+          <a:prstGeom prst="rect">
+            <a:avLst/>
+          </a:prstGeom>
+        </p:spPr>
+      </p:pic>
+    </p:spTree>
+    <p:extLst>
+      <p:ext uri="{BB962C8B-B14F-4D97-AF65-F5344CB8AC3E}">
+        <p14:creationId xmlns:p14="http://schemas.microsoft.com/office/powerpoint/2010/main" val="3071513097"/>
+      </p:ext>
+    </p:extLst>
+  </p:cSld>
+  <p:clrMapOvr>
+    <a:masterClrMapping/>
+  </p:clrMapOvr>
+</p:sld>
+</file>
+
+<file path=ppt/slides/slide4.xml><?xml version="1.0" encoding="utf-8"?>
+<p:sld xmlns:a="http://schemas.openxmlformats.org/drawingml/2006/main" xmlns:r="http://schemas.openxmlformats.org/officeDocument/2006/relationships" xmlns:p="http://schemas.openxmlformats.org/presentationml/2006/main">
+  <p:cSld>
+    <p:spTree>
+      <p:nvGrpSpPr>
+        <p:cNvPr id="1" name=""/>
+        <p:cNvGrpSpPr/>
+        <p:nvPr/>
+      </p:nvGrpSpPr>
+      <p:grpSpPr>
+        <a:xfrm>
+          <a:off x="0" y="0"/>
+          <a:ext cx="0" cy="0"/>
+          <a:chOff x="0" y="0"/>
+          <a:chExt cx="0" cy="0"/>
+        </a:xfrm>
+      </p:grpSpPr>
+      <p:pic>
+        <p:nvPicPr>
+          <p:cNvPr id="4" name="図 3">
+            <a:extLst>
+              <a:ext uri="{FF2B5EF4-FFF2-40B4-BE49-F238E27FC236}">
+                <a16:creationId xmlns:a16="http://schemas.microsoft.com/office/drawing/2014/main" id="{6366B52D-BB23-4741-AE53-62954BF7BD52}"/>
+              </a:ext>
+            </a:extLst>
+          </p:cNvPr>
+          <p:cNvPicPr>
+            <a:picLocks noChangeAspect="1"/>
+          </p:cNvPicPr>
+          <p:nvPr/>
+        </p:nvPicPr>
+        <p:blipFill>
+          <a:blip r:embed="rId2"/>
+          <a:stretch>
+            <a:fillRect/>
+          </a:stretch>
+        </p:blipFill>
+        <p:spPr>
+          <a:xfrm>
+            <a:off x="863600" y="1581150"/>
+            <a:ext cx="10464800" cy="3695700"/>
+          </a:xfrm>
+          <a:prstGeom prst="rect">
+            <a:avLst/>
+          </a:prstGeom>
+        </p:spPr>
+      </p:pic>
+    </p:spTree>
+    <p:extLst>
+      <p:ext uri="{BB962C8B-B14F-4D97-AF65-F5344CB8AC3E}">
+        <p14:creationId xmlns:p14="http://schemas.microsoft.com/office/powerpoint/2010/main" val="3485646285"/>
+      </p:ext>
+    </p:extLst>
+  </p:cSld>
+  <p:clrMapOvr>
+    <a:masterClrMapping/>
+  </p:clrMapOvr>
+</p:sld>
+</file>
+
 <file path=ppt/theme/theme1.xml><?xml version="1.0" encoding="utf-8"?>
 <a:theme xmlns:a="http://schemas.openxmlformats.org/drawingml/2006/main" name="Office テーマ">
   <a:themeElements>

</xml_diff>